<commit_message>
Fixed a minor animation error in the PPTX slides
</commit_message>
<xml_diff>
--- a/lectures/050_reading_and_displaying/Input-Output-Concatenation.pptx
+++ b/lectures/050_reading_and_displaying/Input-Output-Concatenation.pptx
@@ -2578,7 +2578,7 @@
           <a:p>
             <a:fld id="{2507D560-C4D4-4804-8CBF-2C56AB6C6DB9}" type="datetimeFigureOut">
               <a:rPr lang="en-US" smtClean="0"/>
-              <a:t>9/8/2021</a:t>
+              <a:t>9/9/2021</a:t>
             </a:fld>
             <a:endParaRPr lang="en-US"/>
           </a:p>
@@ -2743,7 +2743,7 @@
           <a:p>
             <a:fld id="{688E7586-9A7B-41FF-B169-85DADA744493}" type="datetimeFigureOut">
               <a:rPr lang="en-US" smtClean="0"/>
-              <a:t>9/8/2021</a:t>
+              <a:t>9/9/2021</a:t>
             </a:fld>
             <a:endParaRPr lang="en-US"/>
           </a:p>
@@ -20719,7 +20719,6 @@
               <a:rPr lang="en-US" dirty="0"/>
               <a:t>String modifications</a:t>
             </a:r>
-            <a:endParaRPr lang="en-US" dirty="0"/>
           </a:p>
         </p:txBody>
       </p:sp>
@@ -25743,7 +25742,6 @@
               <a:rPr lang="en-US" b="1" dirty="0"/>
               <a:t>String modifications</a:t>
             </a:r>
-            <a:endParaRPr lang="en-US" b="1" dirty="0"/>
           </a:p>
         </p:txBody>
       </p:sp>
@@ -29082,6 +29080,60 @@
                                   </p:childTnLst>
                                 </p:cTn>
                               </p:par>
+                              <p:par>
+                                <p:cTn id="17" presetID="1" presetClass="entr" presetSubtype="0" fill="hold" grpId="0" nodeType="withEffect">
+                                  <p:stCondLst>
+                                    <p:cond delay="0"/>
+                                  </p:stCondLst>
+                                  <p:childTnLst>
+                                    <p:set>
+                                      <p:cBhvr>
+                                        <p:cTn id="18" dur="1" fill="hold">
+                                          <p:stCondLst>
+                                            <p:cond delay="0"/>
+                                          </p:stCondLst>
+                                        </p:cTn>
+                                        <p:tgtEl>
+                                          <p:spTgt spid="18"/>
+                                        </p:tgtEl>
+                                        <p:attrNameLst>
+                                          <p:attrName>style.visibility</p:attrName>
+                                        </p:attrNameLst>
+                                      </p:cBhvr>
+                                      <p:to>
+                                        <p:strVal val="visible"/>
+                                      </p:to>
+                                    </p:set>
+                                  </p:childTnLst>
+                                </p:cTn>
+                              </p:par>
+                              <p:par>
+                                <p:cTn id="19" presetID="1" presetClass="entr" presetSubtype="0" fill="hold" grpId="0" nodeType="withEffect">
+                                  <p:stCondLst>
+                                    <p:cond delay="0"/>
+                                  </p:stCondLst>
+                                  <p:childTnLst>
+                                    <p:set>
+                                      <p:cBhvr>
+                                        <p:cTn id="20" dur="1" fill="hold">
+                                          <p:stCondLst>
+                                            <p:cond delay="0"/>
+                                          </p:stCondLst>
+                                        </p:cTn>
+                                        <p:tgtEl>
+                                          <p:spTgt spid="21"/>
+                                        </p:tgtEl>
+                                        <p:attrNameLst>
+                                          <p:attrName>style.visibility</p:attrName>
+                                        </p:attrNameLst>
+                                      </p:cBhvr>
+                                      <p:to>
+                                        <p:strVal val="visible"/>
+                                      </p:to>
+                                    </p:set>
+                                  </p:childTnLst>
+                                </p:cTn>
+                              </p:par>
                             </p:childTnLst>
                           </p:cTn>
                         </p:par>
@@ -29089,26 +29141,26 @@
                     </p:cTn>
                   </p:par>
                   <p:par>
-                    <p:cTn id="17" fill="hold">
+                    <p:cTn id="21" fill="hold">
                       <p:stCondLst>
                         <p:cond delay="indefinite"/>
                       </p:stCondLst>
                       <p:childTnLst>
                         <p:par>
-                          <p:cTn id="18" fill="hold">
+                          <p:cTn id="22" fill="hold">
                             <p:stCondLst>
                               <p:cond delay="0"/>
                             </p:stCondLst>
                             <p:childTnLst>
                               <p:par>
-                                <p:cTn id="19" presetID="1" presetClass="entr" presetSubtype="0" fill="hold" grpId="0" nodeType="clickEffect">
+                                <p:cTn id="23" presetID="1" presetClass="entr" presetSubtype="0" fill="hold" grpId="0" nodeType="clickEffect">
                                   <p:stCondLst>
                                     <p:cond delay="0"/>
                                   </p:stCondLst>
                                   <p:childTnLst>
                                     <p:set>
                                       <p:cBhvr>
-                                        <p:cTn id="20" dur="1" fill="hold">
+                                        <p:cTn id="24" dur="1" fill="hold">
                                           <p:stCondLst>
                                             <p:cond delay="0"/>
                                           </p:stCondLst>
@@ -29156,6 +29208,8 @@
     </p:tnLst>
     <p:bldLst>
       <p:bldP spid="17" grpId="0" animBg="1"/>
+      <p:bldP spid="18" grpId="0"/>
+      <p:bldP spid="21" grpId="0"/>
       <p:bldP spid="22" grpId="0"/>
       <p:bldP spid="28" grpId="0"/>
     </p:bldLst>

</xml_diff>